<commit_message>
Matrikelnummern in den Anhang eingefügt
</commit_message>
<xml_diff>
--- a/Anhang.pptx
+++ b/Anhang.pptx
@@ -2988,7 +2988,12 @@
             <p:ph type="subTitle" idx="1"/>
           </p:nvPr>
         </p:nvSpPr>
-        <p:spPr/>
+        <p:spPr>
+          <a:xfrm>
+            <a:off x="0" y="3602038"/>
+            <a:ext cx="12192000" cy="1655762"/>
+          </a:xfrm>
+        </p:spPr>
         <p:txBody>
           <a:bodyPr/>
           <a:lstStyle/>
@@ -3014,15 +3019,19 @@
           <a:p>
             <a:r>
               <a:rPr lang="de-DE" dirty="0"/>
-              <a:t>Daniel Janzen, Robert </a:t>
+              <a:t>Daniel Janzen, Robert Jonetzko, Niels </a:t>
             </a:r>
             <a:r>
               <a:rPr lang="de-DE" dirty="0" err="1"/>
-              <a:t>Jonetzko</a:t>
-            </a:r>
+              <a:t>Quanz</a:t>
+            </a:r>
+            <a:endParaRPr lang="de-DE" dirty="0"/>
+          </a:p>
+          <a:p>
+            <a:pPr algn="l"/>
             <a:r>
               <a:rPr lang="de-DE" dirty="0"/>
-              <a:t>, Niels Quanz</a:t>
+              <a:t>      Matrikelnummern: 	000000 	829719 	545607</a:t>
             </a:r>
           </a:p>
           <a:p>

</xml_diff>

<commit_message>
Um meine Sachen ergänzt
Hab mein Zeug hinzugefügt.
</commit_message>
<xml_diff>
--- a/Anhang.pptx
+++ b/Anhang.pptx
@@ -3031,7 +3031,7 @@
             <a:pPr algn="l"/>
             <a:r>
               <a:rPr lang="de-DE" dirty="0"/>
-              <a:t>      Matrikelnummern: 	000000 	829719 	545607</a:t>
+              <a:t>      Matrikelnummern: 	844890 	829719 	545607</a:t>
             </a:r>
           </a:p>
           <a:p>
@@ -5582,7 +5582,11 @@
           </p:cNvGraphicFramePr>
           <p:nvPr>
             <p:ph idx="1"/>
-            <p:extLst/>
+            <p:extLst>
+              <p:ext uri="{D42A27DB-BD31-4B8C-83A1-F6EECF244321}">
+                <p14:modId xmlns:p14="http://schemas.microsoft.com/office/powerpoint/2010/main" val="2966726759"/>
+              </p:ext>
+            </p:extLst>
           </p:nvPr>
         </p:nvGraphicFramePr>
         <p:xfrm>
@@ -6125,7 +6129,15 @@
                     <a:p>
                       <a:r>
                         <a:rPr lang="de-DE" dirty="0"/>
-                        <a:t>Menu | Item Drop | Item Design</a:t>
+                        <a:t>Menu | Item Drop | Item Design | neue Level Generierung | Spieler Tod/</a:t>
+                      </a:r>
+                      <a:r>
+                        <a:rPr lang="de-DE" dirty="0" err="1"/>
+                        <a:t>Reset</a:t>
+                      </a:r>
+                      <a:r>
+                        <a:rPr lang="de-DE" dirty="0"/>
+                        <a:t> </a:t>
                       </a:r>
                     </a:p>
                     <a:p>
@@ -6414,8 +6426,37 @@
           <a:p>
             <a:r>
               <a:rPr lang="de-DE" dirty="0"/>
-              <a:t>Menü</a:t>
-            </a:r>
+              <a:t>Menü 5h</a:t>
+            </a:r>
+          </a:p>
+          <a:p>
+            <a:r>
+              <a:rPr lang="de-DE" dirty="0"/>
+              <a:t>Item Drop und Design 5h</a:t>
+            </a:r>
+          </a:p>
+          <a:p>
+            <a:r>
+              <a:rPr lang="de-DE" dirty="0"/>
+              <a:t>Neue Level Generierung 10h</a:t>
+            </a:r>
+          </a:p>
+          <a:p>
+            <a:r>
+              <a:rPr lang="de-DE" dirty="0"/>
+              <a:t>Spieler Tod und </a:t>
+            </a:r>
+            <a:r>
+              <a:rPr lang="de-DE" dirty="0" err="1"/>
+              <a:t>Reset</a:t>
+            </a:r>
+            <a:r>
+              <a:rPr lang="de-DE" dirty="0"/>
+              <a:t> 10h</a:t>
+            </a:r>
+          </a:p>
+          <a:p>
+            <a:endParaRPr lang="de-DE" dirty="0"/>
           </a:p>
           <a:p>
             <a:endParaRPr lang="de-DE" dirty="0"/>

</xml_diff>

<commit_message>
Etwas im Anhang eingefügt
</commit_message>
<xml_diff>
--- a/Anhang.pptx
+++ b/Anhang.pptx
@@ -3079,9 +3079,16 @@
             <p:ph type="title"/>
           </p:nvPr>
         </p:nvSpPr>
-        <p:spPr/>
-        <p:txBody>
-          <a:bodyPr/>
+        <p:spPr>
+          <a:xfrm>
+            <a:off x="838200" y="365126"/>
+            <a:ext cx="10515600" cy="574442"/>
+          </a:xfrm>
+        </p:spPr>
+        <p:txBody>
+          <a:bodyPr>
+            <a:normAutofit fontScale="90000"/>
+          </a:bodyPr>
           <a:lstStyle/>
           <a:p>
             <a:r>
@@ -3101,12 +3108,197 @@
             <p:ph idx="1"/>
           </p:nvPr>
         </p:nvSpPr>
-        <p:spPr/>
-        <p:txBody>
-          <a:bodyPr/>
+        <p:spPr>
+          <a:xfrm>
+            <a:off x="838200" y="939568"/>
+            <a:ext cx="10515600" cy="5553306"/>
+          </a:xfrm>
+        </p:spPr>
+        <p:txBody>
+          <a:bodyPr>
+            <a:normAutofit/>
+          </a:bodyPr>
           <a:lstStyle/>
           <a:p>
-            <a:endParaRPr lang="de-DE" dirty="0"/>
+            <a:r>
+              <a:rPr lang="de-DE" sz="1800" dirty="0"/>
+              <a:t>Level besteht aus einer achteckigen Oberfläche, welches am Anfang mit Wänden, Bäumen, Steinen und Pilzfallen bestückt wird</a:t>
+            </a:r>
+          </a:p>
+          <a:p>
+            <a:pPr lvl="1"/>
+            <a:r>
+              <a:rPr lang="de-DE" sz="1400" dirty="0"/>
+              <a:t>Anzahl und Positionierung übernimmt die Klasse Spawn</a:t>
+            </a:r>
+          </a:p>
+          <a:p>
+            <a:r>
+              <a:rPr lang="de-DE" sz="1800" dirty="0"/>
+              <a:t>Spieler und Gegner können sich bewegen, Gegner bewegt sich auf den Spieler zu</a:t>
+            </a:r>
+          </a:p>
+          <a:p>
+            <a:pPr lvl="1"/>
+            <a:r>
+              <a:rPr lang="de-DE" sz="1400" dirty="0"/>
+              <a:t>Spielerbewegung übernimmt Klasse Movement, Gegnerbewegung übernimmt Klasse KI</a:t>
+            </a:r>
+          </a:p>
+          <a:p>
+            <a:r>
+              <a:rPr lang="de-DE" sz="1800" dirty="0"/>
+              <a:t>Pilzfallen lösen eine Explosion aus, wenn Spieler über diese läuft und schleudert den Spieler weg</a:t>
+            </a:r>
+          </a:p>
+          <a:p>
+            <a:pPr lvl="1"/>
+            <a:r>
+              <a:rPr lang="de-DE" sz="1400" dirty="0"/>
+              <a:t>Explosion und </a:t>
+            </a:r>
+            <a:r>
+              <a:rPr lang="de-DE" sz="1400" dirty="0" err="1"/>
+              <a:t>Knockback</a:t>
+            </a:r>
+            <a:r>
+              <a:rPr lang="de-DE" sz="1400" dirty="0"/>
+              <a:t> übernimmt Klasse Explosion</a:t>
+            </a:r>
+          </a:p>
+          <a:p>
+            <a:r>
+              <a:rPr lang="de-DE" sz="1800" dirty="0"/>
+              <a:t>Spieler und Gegner haben drei Werte: Rüstung (Armor), Lebenspunkte (Hitpoints) und Angriffsstärke (</a:t>
+            </a:r>
+            <a:r>
+              <a:rPr lang="de-DE" sz="1800" dirty="0" err="1"/>
+              <a:t>Attack</a:t>
+            </a:r>
+            <a:r>
+              <a:rPr lang="de-DE" sz="1800" dirty="0"/>
+              <a:t>)</a:t>
+            </a:r>
+          </a:p>
+          <a:p>
+            <a:pPr lvl="1"/>
+            <a:r>
+              <a:rPr lang="de-DE" sz="1400" dirty="0"/>
+              <a:t>Management der Spielerwerte übernimmt die Klasse </a:t>
+            </a:r>
+            <a:r>
+              <a:rPr lang="de-DE" sz="1400" dirty="0" err="1"/>
+              <a:t>PlayerStats</a:t>
+            </a:r>
+            <a:r>
+              <a:rPr lang="de-DE" sz="1400" dirty="0"/>
+              <a:t>, für die Gegnerwerte ist Klasse </a:t>
+            </a:r>
+            <a:r>
+              <a:rPr lang="de-DE" sz="1400" dirty="0" err="1"/>
+              <a:t>EnemyStats</a:t>
+            </a:r>
+            <a:r>
+              <a:rPr lang="de-DE" sz="1400" dirty="0"/>
+              <a:t> zuständig</a:t>
+            </a:r>
+          </a:p>
+          <a:p>
+            <a:r>
+              <a:rPr lang="de-DE" sz="1800" dirty="0"/>
+              <a:t>UI zeigt die Werte des Spielers in Echtzeit an</a:t>
+            </a:r>
+          </a:p>
+          <a:p>
+            <a:pPr lvl="1"/>
+            <a:r>
+              <a:rPr lang="de-DE" sz="1400" dirty="0"/>
+              <a:t>UI Aktualisierungen übernimmt Klasse </a:t>
+            </a:r>
+            <a:r>
+              <a:rPr lang="de-DE" sz="1400" dirty="0" err="1"/>
+              <a:t>PlayerStats</a:t>
+            </a:r>
+            <a:endParaRPr lang="de-DE" sz="1400" dirty="0"/>
+          </a:p>
+          <a:p>
+            <a:r>
+              <a:rPr lang="de-DE" sz="1800" dirty="0"/>
+              <a:t>Spieler und Gegner können sich gegenseitig Schaden, Spieler muss angreifen und Gegner muss Spieler berühren, bei Gegnerberührung wird der Spieler vom Gegner weggeschleudert</a:t>
+            </a:r>
+          </a:p>
+          <a:p>
+            <a:pPr lvl="1"/>
+            <a:r>
+              <a:rPr lang="de-DE" sz="1400" dirty="0"/>
+              <a:t>Angriff des Spielers übernimmt </a:t>
+            </a:r>
+            <a:r>
+              <a:rPr lang="de-DE" sz="1400" dirty="0" err="1"/>
+              <a:t>PlayerAttack</a:t>
+            </a:r>
+            <a:r>
+              <a:rPr lang="de-DE" sz="1400" dirty="0"/>
+              <a:t> und Berührung des Gegner übernimmt Klasse </a:t>
+            </a:r>
+            <a:r>
+              <a:rPr lang="de-DE" sz="1400" dirty="0" err="1"/>
+              <a:t>PlayerStats</a:t>
+            </a:r>
+            <a:endParaRPr lang="de-DE" sz="1400" dirty="0"/>
+          </a:p>
+          <a:p>
+            <a:r>
+              <a:rPr lang="de-DE" sz="1800" dirty="0"/>
+              <a:t>Gegner lässt nach Tod verschiedene Items fallen: Rüstung, Waffe und Schlüssel, </a:t>
+            </a:r>
+          </a:p>
+          <a:p>
+            <a:pPr lvl="1"/>
+            <a:r>
+              <a:rPr lang="de-DE" sz="1400" dirty="0" err="1"/>
+              <a:t>Itemdrops</a:t>
+            </a:r>
+            <a:r>
+              <a:rPr lang="de-DE" sz="1400" dirty="0"/>
+              <a:t> übernimmt Klasse </a:t>
+            </a:r>
+            <a:r>
+              <a:rPr lang="de-DE" sz="1400" dirty="0" err="1"/>
+              <a:t>EnemyStats</a:t>
+            </a:r>
+            <a:endParaRPr lang="de-DE" sz="1400" dirty="0"/>
+          </a:p>
+          <a:p>
+            <a:r>
+              <a:rPr lang="de-DE" sz="1800" dirty="0"/>
+              <a:t>Nach Aufnahme des Schlüssels erscheint ein Tor zum nächsten Level</a:t>
+            </a:r>
+          </a:p>
+          <a:p>
+            <a:pPr lvl="1"/>
+            <a:r>
+              <a:rPr lang="de-DE" sz="1400" dirty="0" err="1"/>
+              <a:t>Spawning</a:t>
+            </a:r>
+            <a:r>
+              <a:rPr lang="de-DE" sz="1400" dirty="0"/>
+              <a:t> des Tors übernimmt Klasse </a:t>
+            </a:r>
+            <a:r>
+              <a:rPr lang="de-DE" sz="1400" dirty="0" err="1"/>
+              <a:t>EnemyStats</a:t>
+            </a:r>
+            <a:r>
+              <a:rPr lang="de-DE" sz="1400" dirty="0"/>
+              <a:t> und nächstes Level sowie Übernahme der Werte übernimmt Klasse Gate</a:t>
+            </a:r>
+          </a:p>
+          <a:p>
+            <a:pPr marL="0" indent="0">
+              <a:buNone/>
+            </a:pPr>
+            <a:endParaRPr lang="de-DE" sz="1800" dirty="0"/>
           </a:p>
         </p:txBody>
       </p:sp>

</xml_diff>